<commit_message>
CEG7850: Final Project Code Complete. CEG6850 Code Stable-needs reworked inputs
</commit_message>
<xml_diff>
--- a/CEG6850/CEG 6850 Foundations in AI Final Presentation.pptx
+++ b/CEG6850/CEG 6850 Foundations in AI Final Presentation.pptx
@@ -3874,7 +3874,7 @@
             </a:pPr>
             <a:r>
               <a:rPr lang="en-US" dirty="0"/>
-              <a:t> Initial Database Creation</a:t>
+              <a:t> Initial Database Creation &amp; Reasoning</a:t>
             </a:r>
           </a:p>
           <a:p>
@@ -3894,7 +3894,7 @@
             </a:pPr>
             <a:r>
               <a:rPr lang="en-US" dirty="0"/>
-              <a:t> Non-Monotonic Reasoning</a:t>
+              <a:t> Solution</a:t>
             </a:r>
           </a:p>
           <a:p>
@@ -4334,7 +4334,7 @@
         <p:spPr/>
         <p:txBody>
           <a:bodyPr>
-            <a:normAutofit fontScale="92500" lnSpcReduction="10000"/>
+            <a:normAutofit lnSpcReduction="10000"/>
           </a:bodyPr>
           <a:lstStyle/>
           <a:p>
@@ -4612,194 +4612,8 @@
                 <a:ea typeface="Calibri" panose="020F0502020204030204" pitchFamily="34" charset="0"/>
                 <a:cs typeface="Times New Roman" panose="02020603050405020304" pitchFamily="18" charset="0"/>
               </a:rPr>
-              <a:t>“you program must perform the sequence of actions on the blocks by a two robotic arms with box grasping capabilities”</a:t>
-            </a:r>
-          </a:p>
-          <a:p>
-            <a:pPr marL="0" marR="0">
-              <a:lnSpc>
-                <a:spcPct val="107000"/>
-              </a:lnSpc>
-              <a:spcBef>
-                <a:spcPts val="0"/>
-              </a:spcBef>
-              <a:spcAft>
-                <a:spcPts val="800"/>
-              </a:spcAft>
-            </a:pPr>
-            <a:r>
-              <a:rPr lang="en-US" sz="1600" dirty="0">
-                <a:effectLst/>
-                <a:latin typeface="Calibri" panose="020F0502020204030204" pitchFamily="34" charset="0"/>
-                <a:ea typeface="Calibri" panose="020F0502020204030204" pitchFamily="34" charset="0"/>
-                <a:cs typeface="Calibri" panose="020F0502020204030204" pitchFamily="34" charset="0"/>
-              </a:rPr>
-              <a:t>Ɐ</a:t>
-            </a:r>
-            <a:r>
-              <a:rPr lang="en-US" sz="1600" dirty="0" err="1">
-                <a:effectLst/>
-                <a:latin typeface="Calibri" panose="020F0502020204030204" pitchFamily="34" charset="0"/>
-                <a:ea typeface="Calibri" panose="020F0502020204030204" pitchFamily="34" charset="0"/>
-                <a:cs typeface="Calibri" panose="020F0502020204030204" pitchFamily="34" charset="0"/>
-              </a:rPr>
-              <a:t>xⱯzⱯi</a:t>
-            </a:r>
-            <a:r>
-              <a:rPr lang="en-US" sz="1600" dirty="0">
-                <a:effectLst/>
-                <a:latin typeface="Calibri" panose="020F0502020204030204" pitchFamily="34" charset="0"/>
-                <a:ea typeface="Calibri" panose="020F0502020204030204" pitchFamily="34" charset="0"/>
-                <a:cs typeface="Calibri" panose="020F0502020204030204" pitchFamily="34" charset="0"/>
-              </a:rPr>
-              <a:t> </a:t>
-            </a:r>
-            <a:r>
-              <a:rPr lang="en-US" sz="1600" dirty="0">
-                <a:effectLst/>
-                <a:latin typeface="Calibri" panose="020F0502020204030204" pitchFamily="34" charset="0"/>
-                <a:ea typeface="Calibri" panose="020F0502020204030204" pitchFamily="34" charset="0"/>
-                <a:cs typeface="Times New Roman" panose="02020603050405020304" pitchFamily="18" charset="0"/>
-              </a:rPr>
-              <a:t>Block(x) </a:t>
-            </a:r>
-            <a:r>
-              <a:rPr lang="en-US" sz="1600" dirty="0">
-                <a:effectLst/>
-                <a:latin typeface="Calibri" panose="020F0502020204030204" pitchFamily="34" charset="0"/>
-                <a:ea typeface="Calibri" panose="020F0502020204030204" pitchFamily="34" charset="0"/>
-                <a:cs typeface="Calibri" panose="020F0502020204030204" pitchFamily="34" charset="0"/>
-              </a:rPr>
-              <a:t>Ʌ Arm(</a:t>
-            </a:r>
-            <a:r>
-              <a:rPr lang="en-US" sz="1600" dirty="0" err="1">
-                <a:effectLst/>
-                <a:latin typeface="Calibri" panose="020F0502020204030204" pitchFamily="34" charset="0"/>
-                <a:ea typeface="Calibri" panose="020F0502020204030204" pitchFamily="34" charset="0"/>
-                <a:cs typeface="Calibri" panose="020F0502020204030204" pitchFamily="34" charset="0"/>
-              </a:rPr>
-              <a:t>i</a:t>
-            </a:r>
-            <a:r>
-              <a:rPr lang="en-US" sz="1600" dirty="0">
-                <a:effectLst/>
-                <a:latin typeface="Calibri" panose="020F0502020204030204" pitchFamily="34" charset="0"/>
-                <a:ea typeface="Calibri" panose="020F0502020204030204" pitchFamily="34" charset="0"/>
-                <a:cs typeface="Calibri" panose="020F0502020204030204" pitchFamily="34" charset="0"/>
-              </a:rPr>
-              <a:t>) Ʌ</a:t>
-            </a:r>
-            <a:r>
-              <a:rPr lang="en-US" sz="1600" dirty="0">
-                <a:effectLst/>
-                <a:latin typeface="Calibri" panose="020F0502020204030204" pitchFamily="34" charset="0"/>
-                <a:ea typeface="Calibri" panose="020F0502020204030204" pitchFamily="34" charset="0"/>
-                <a:cs typeface="Times New Roman" panose="02020603050405020304" pitchFamily="18" charset="0"/>
-              </a:rPr>
-              <a:t> Action(z) </a:t>
-            </a:r>
-            <a:r>
-              <a:rPr lang="en-US" sz="1600" dirty="0">
-                <a:effectLst/>
-                <a:latin typeface="Calibri" panose="020F0502020204030204" pitchFamily="34" charset="0"/>
-                <a:ea typeface="Calibri" panose="020F0502020204030204" pitchFamily="34" charset="0"/>
-                <a:cs typeface="Times New Roman" panose="02020603050405020304" pitchFamily="18" charset="0"/>
-                <a:sym typeface="Wingdings" panose="05000000000000000000" pitchFamily="2" charset="2"/>
-              </a:rPr>
-              <a:t></a:t>
-            </a:r>
-            <a:r>
-              <a:rPr lang="en-US" sz="1600" dirty="0">
-                <a:effectLst/>
-                <a:latin typeface="Calibri" panose="020F0502020204030204" pitchFamily="34" charset="0"/>
-                <a:ea typeface="Calibri" panose="020F0502020204030204" pitchFamily="34" charset="0"/>
-                <a:cs typeface="Times New Roman" panose="02020603050405020304" pitchFamily="18" charset="0"/>
-              </a:rPr>
-              <a:t> </a:t>
-            </a:r>
-            <a:r>
-              <a:rPr lang="en-US" sz="1600" dirty="0" err="1">
-                <a:effectLst/>
-                <a:latin typeface="Calibri" panose="020F0502020204030204" pitchFamily="34" charset="0"/>
-                <a:ea typeface="Calibri" panose="020F0502020204030204" pitchFamily="34" charset="0"/>
-                <a:cs typeface="Calibri" panose="020F0502020204030204" pitchFamily="34" charset="0"/>
-              </a:rPr>
-              <a:t>Ⴈⱻ</a:t>
-            </a:r>
-            <a:r>
-              <a:rPr lang="en-US" sz="1600" dirty="0" err="1">
-                <a:effectLst/>
-                <a:latin typeface="Calibri" panose="020F0502020204030204" pitchFamily="34" charset="0"/>
-                <a:ea typeface="Calibri" panose="020F0502020204030204" pitchFamily="34" charset="0"/>
-                <a:cs typeface="Times New Roman" panose="02020603050405020304" pitchFamily="18" charset="0"/>
-              </a:rPr>
-              <a:t>y</a:t>
-            </a:r>
-            <a:r>
-              <a:rPr lang="en-US" sz="1600" dirty="0">
-                <a:effectLst/>
-                <a:latin typeface="Calibri" panose="020F0502020204030204" pitchFamily="34" charset="0"/>
-                <a:ea typeface="Calibri" panose="020F0502020204030204" pitchFamily="34" charset="0"/>
-                <a:cs typeface="Times New Roman" panose="02020603050405020304" pitchFamily="18" charset="0"/>
-              </a:rPr>
-              <a:t> Block(y) </a:t>
-            </a:r>
-            <a:r>
-              <a:rPr lang="en-US" sz="1600" dirty="0">
-                <a:effectLst/>
-                <a:latin typeface="Calibri" panose="020F0502020204030204" pitchFamily="34" charset="0"/>
-                <a:ea typeface="Calibri" panose="020F0502020204030204" pitchFamily="34" charset="0"/>
-                <a:cs typeface="Calibri" panose="020F0502020204030204" pitchFamily="34" charset="0"/>
-              </a:rPr>
-              <a:t>Ʌ Arm(</a:t>
-            </a:r>
-            <a:r>
-              <a:rPr lang="en-US" sz="1600" dirty="0" err="1">
-                <a:effectLst/>
-                <a:latin typeface="Calibri" panose="020F0502020204030204" pitchFamily="34" charset="0"/>
-                <a:ea typeface="Calibri" panose="020F0502020204030204" pitchFamily="34" charset="0"/>
-                <a:cs typeface="Calibri" panose="020F0502020204030204" pitchFamily="34" charset="0"/>
-              </a:rPr>
-              <a:t>i</a:t>
-            </a:r>
-            <a:r>
-              <a:rPr lang="en-US" sz="1600" dirty="0">
-                <a:effectLst/>
-                <a:latin typeface="Calibri" panose="020F0502020204030204" pitchFamily="34" charset="0"/>
-                <a:ea typeface="Calibri" panose="020F0502020204030204" pitchFamily="34" charset="0"/>
-                <a:cs typeface="Calibri" panose="020F0502020204030204" pitchFamily="34" charset="0"/>
-              </a:rPr>
-              <a:t>) Ʌ Action(z)				</a:t>
-            </a:r>
-            <a:r>
-              <a:rPr lang="en-US" sz="1600" dirty="0">
-                <a:effectLst/>
-                <a:latin typeface="Calibri" panose="020F0502020204030204" pitchFamily="34" charset="0"/>
-                <a:ea typeface="Calibri" panose="020F0502020204030204" pitchFamily="34" charset="0"/>
-                <a:cs typeface="Times New Roman" panose="02020603050405020304" pitchFamily="18" charset="0"/>
-              </a:rPr>
-              <a:t> ∆3</a:t>
-            </a:r>
-          </a:p>
-          <a:p>
-            <a:pPr marL="0" marR="0">
-              <a:lnSpc>
-                <a:spcPct val="107000"/>
-              </a:lnSpc>
-              <a:spcBef>
-                <a:spcPts val="0"/>
-              </a:spcBef>
-              <a:spcAft>
-                <a:spcPts val="800"/>
-              </a:spcAft>
-            </a:pPr>
-            <a:endParaRPr lang="en-US" sz="1600" dirty="0">
-              <a:effectLst/>
-              <a:latin typeface="Calibri" panose="020F0502020204030204" pitchFamily="34" charset="0"/>
-              <a:ea typeface="Calibri" panose="020F0502020204030204" pitchFamily="34" charset="0"/>
-              <a:cs typeface="Times New Roman" panose="02020603050405020304" pitchFamily="18" charset="0"/>
-            </a:endParaRPr>
+              <a:t>“your program must perform the sequence of actions on the blocks by a two robotic arms with box grasping capabilities”</a:t>
+            </a:r>
           </a:p>
           <a:p>
             <a:pPr marL="194310" marR="0" indent="-285750">
@@ -4842,12 +4656,173 @@
               </a:rPr>
               <a:t>”</a:t>
             </a:r>
-            <a:endParaRPr lang="en-US" sz="1600" dirty="0">
-              <a:effectLst/>
-              <a:latin typeface="Calibri" panose="020F0502020204030204" pitchFamily="34" charset="0"/>
-              <a:ea typeface="Calibri" panose="020F0502020204030204" pitchFamily="34" charset="0"/>
-              <a:cs typeface="Times New Roman" panose="02020603050405020304" pitchFamily="18" charset="0"/>
-            </a:endParaRPr>
+          </a:p>
+          <a:p>
+            <a:pPr marL="0" marR="0">
+              <a:lnSpc>
+                <a:spcPct val="107000"/>
+              </a:lnSpc>
+              <a:spcBef>
+                <a:spcPts val="0"/>
+              </a:spcBef>
+              <a:spcAft>
+                <a:spcPts val="800"/>
+              </a:spcAft>
+            </a:pPr>
+            <a:r>
+              <a:rPr lang="en-US" sz="1600" dirty="0">
+                <a:effectLst/>
+                <a:latin typeface="Calibri" panose="020F0502020204030204" pitchFamily="34" charset="0"/>
+                <a:ea typeface="Calibri" panose="020F0502020204030204" pitchFamily="34" charset="0"/>
+                <a:cs typeface="Calibri" panose="020F0502020204030204" pitchFamily="34" charset="0"/>
+              </a:rPr>
+              <a:t>Ɐ</a:t>
+            </a:r>
+            <a:r>
+              <a:rPr lang="en-US" sz="1600" dirty="0" err="1">
+                <a:effectLst/>
+                <a:latin typeface="Calibri" panose="020F0502020204030204" pitchFamily="34" charset="0"/>
+                <a:ea typeface="Calibri" panose="020F0502020204030204" pitchFamily="34" charset="0"/>
+                <a:cs typeface="Calibri" panose="020F0502020204030204" pitchFamily="34" charset="0"/>
+              </a:rPr>
+              <a:t>xⱯzⱯi</a:t>
+            </a:r>
+            <a:r>
+              <a:rPr lang="en-US" sz="1600" dirty="0">
+                <a:effectLst/>
+                <a:latin typeface="Calibri" panose="020F0502020204030204" pitchFamily="34" charset="0"/>
+                <a:ea typeface="Calibri" panose="020F0502020204030204" pitchFamily="34" charset="0"/>
+                <a:cs typeface="Calibri" panose="020F0502020204030204" pitchFamily="34" charset="0"/>
+              </a:rPr>
+              <a:t> </a:t>
+            </a:r>
+            <a:r>
+              <a:rPr lang="en-US" sz="1600" dirty="0">
+                <a:effectLst/>
+                <a:latin typeface="Calibri" panose="020F0502020204030204" pitchFamily="34" charset="0"/>
+                <a:ea typeface="Calibri" panose="020F0502020204030204" pitchFamily="34" charset="0"/>
+                <a:cs typeface="Times New Roman" panose="02020603050405020304" pitchFamily="18" charset="0"/>
+              </a:rPr>
+              <a:t>Block(x) </a:t>
+            </a:r>
+            <a:r>
+              <a:rPr lang="en-US" sz="1600" dirty="0">
+                <a:effectLst/>
+                <a:latin typeface="Calibri" panose="020F0502020204030204" pitchFamily="34" charset="0"/>
+                <a:ea typeface="Calibri" panose="020F0502020204030204" pitchFamily="34" charset="0"/>
+                <a:cs typeface="Calibri" panose="020F0502020204030204" pitchFamily="34" charset="0"/>
+              </a:rPr>
+              <a:t>Ʌ Arm(</a:t>
+            </a:r>
+            <a:r>
+              <a:rPr lang="en-US" sz="1600" dirty="0" err="1">
+                <a:effectLst/>
+                <a:latin typeface="Calibri" panose="020F0502020204030204" pitchFamily="34" charset="0"/>
+                <a:ea typeface="Calibri" panose="020F0502020204030204" pitchFamily="34" charset="0"/>
+                <a:cs typeface="Calibri" panose="020F0502020204030204" pitchFamily="34" charset="0"/>
+              </a:rPr>
+              <a:t>i</a:t>
+            </a:r>
+            <a:r>
+              <a:rPr lang="en-US" sz="1600" dirty="0">
+                <a:effectLst/>
+                <a:latin typeface="Calibri" panose="020F0502020204030204" pitchFamily="34" charset="0"/>
+                <a:ea typeface="Calibri" panose="020F0502020204030204" pitchFamily="34" charset="0"/>
+                <a:cs typeface="Calibri" panose="020F0502020204030204" pitchFamily="34" charset="0"/>
+              </a:rPr>
+              <a:t>) Ʌ</a:t>
+            </a:r>
+            <a:r>
+              <a:rPr lang="en-US" sz="1600" dirty="0">
+                <a:effectLst/>
+                <a:latin typeface="Calibri" panose="020F0502020204030204" pitchFamily="34" charset="0"/>
+                <a:ea typeface="Calibri" panose="020F0502020204030204" pitchFamily="34" charset="0"/>
+                <a:cs typeface="Times New Roman" panose="02020603050405020304" pitchFamily="18" charset="0"/>
+              </a:rPr>
+              <a:t> Action(z) </a:t>
+            </a:r>
+            <a:r>
+              <a:rPr lang="en-US" sz="1600" dirty="0">
+                <a:effectLst/>
+                <a:latin typeface="Calibri" panose="020F0502020204030204" pitchFamily="34" charset="0"/>
+                <a:ea typeface="Calibri" panose="020F0502020204030204" pitchFamily="34" charset="0"/>
+                <a:cs typeface="Times New Roman" panose="02020603050405020304" pitchFamily="18" charset="0"/>
+                <a:sym typeface="Wingdings" panose="05000000000000000000" pitchFamily="2" charset="2"/>
+              </a:rPr>
+              <a:t></a:t>
+            </a:r>
+            <a:r>
+              <a:rPr lang="en-US" sz="1600" dirty="0">
+                <a:effectLst/>
+                <a:latin typeface="Calibri" panose="020F0502020204030204" pitchFamily="34" charset="0"/>
+                <a:ea typeface="Calibri" panose="020F0502020204030204" pitchFamily="34" charset="0"/>
+                <a:cs typeface="Times New Roman" panose="02020603050405020304" pitchFamily="18" charset="0"/>
+              </a:rPr>
+              <a:t> </a:t>
+            </a:r>
+            <a:r>
+              <a:rPr lang="en-US" sz="1600" dirty="0" err="1">
+                <a:effectLst/>
+                <a:latin typeface="Calibri" panose="020F0502020204030204" pitchFamily="34" charset="0"/>
+                <a:ea typeface="Calibri" panose="020F0502020204030204" pitchFamily="34" charset="0"/>
+                <a:cs typeface="Calibri" panose="020F0502020204030204" pitchFamily="34" charset="0"/>
+              </a:rPr>
+              <a:t>Ⴈⱻ</a:t>
+            </a:r>
+            <a:r>
+              <a:rPr lang="en-US" sz="1600" dirty="0" err="1">
+                <a:effectLst/>
+                <a:latin typeface="Calibri" panose="020F0502020204030204" pitchFamily="34" charset="0"/>
+                <a:ea typeface="Calibri" panose="020F0502020204030204" pitchFamily="34" charset="0"/>
+                <a:cs typeface="Times New Roman" panose="02020603050405020304" pitchFamily="18" charset="0"/>
+              </a:rPr>
+              <a:t>y</a:t>
+            </a:r>
+            <a:r>
+              <a:rPr lang="en-US" sz="1600" dirty="0">
+                <a:effectLst/>
+                <a:latin typeface="Calibri" panose="020F0502020204030204" pitchFamily="34" charset="0"/>
+                <a:ea typeface="Calibri" panose="020F0502020204030204" pitchFamily="34" charset="0"/>
+                <a:cs typeface="Times New Roman" panose="02020603050405020304" pitchFamily="18" charset="0"/>
+              </a:rPr>
+              <a:t> Block(y) </a:t>
+            </a:r>
+            <a:r>
+              <a:rPr lang="en-US" sz="1600" dirty="0">
+                <a:effectLst/>
+                <a:latin typeface="Calibri" panose="020F0502020204030204" pitchFamily="34" charset="0"/>
+                <a:ea typeface="Calibri" panose="020F0502020204030204" pitchFamily="34" charset="0"/>
+                <a:cs typeface="Calibri" panose="020F0502020204030204" pitchFamily="34" charset="0"/>
+              </a:rPr>
+              <a:t>Ʌ Arm(</a:t>
+            </a:r>
+            <a:r>
+              <a:rPr lang="en-US" sz="1600" dirty="0" err="1">
+                <a:effectLst/>
+                <a:latin typeface="Calibri" panose="020F0502020204030204" pitchFamily="34" charset="0"/>
+                <a:ea typeface="Calibri" panose="020F0502020204030204" pitchFamily="34" charset="0"/>
+                <a:cs typeface="Calibri" panose="020F0502020204030204" pitchFamily="34" charset="0"/>
+              </a:rPr>
+              <a:t>i</a:t>
+            </a:r>
+            <a:r>
+              <a:rPr lang="en-US" sz="1600" dirty="0">
+                <a:effectLst/>
+                <a:latin typeface="Calibri" panose="020F0502020204030204" pitchFamily="34" charset="0"/>
+                <a:ea typeface="Calibri" panose="020F0502020204030204" pitchFamily="34" charset="0"/>
+                <a:cs typeface="Calibri" panose="020F0502020204030204" pitchFamily="34" charset="0"/>
+              </a:rPr>
+              <a:t>) Ʌ Action(z)				</a:t>
+            </a:r>
+            <a:r>
+              <a:rPr lang="en-US" sz="1600" dirty="0">
+                <a:effectLst/>
+                <a:latin typeface="Calibri" panose="020F0502020204030204" pitchFamily="34" charset="0"/>
+                <a:ea typeface="Calibri" panose="020F0502020204030204" pitchFamily="34" charset="0"/>
+                <a:cs typeface="Times New Roman" panose="02020603050405020304" pitchFamily="18" charset="0"/>
+              </a:rPr>
+              <a:t> ∆3</a:t>
+            </a:r>
           </a:p>
           <a:p>
             <a:pPr marL="0" marR="0">
@@ -5134,7 +5109,7 @@
         </p:spPr>
         <p:txBody>
           <a:bodyPr>
-            <a:normAutofit lnSpcReduction="10000"/>
+            <a:normAutofit/>
           </a:bodyPr>
           <a:lstStyle/>
           <a:p>
@@ -5225,7 +5200,7 @@
                 <a:ea typeface="Calibri" panose="020F0502020204030204" pitchFamily="34" charset="0"/>
                 <a:cs typeface="Times New Roman" panose="02020603050405020304" pitchFamily="18" charset="0"/>
               </a:rPr>
-              <a:t> L1(x) </a:t>
+              <a:t> (L1(x) V L2(x) </a:t>
             </a:r>
             <a:r>
               <a:rPr lang="en-US" sz="1400" dirty="0">
@@ -5286,32 +5261,6 @@
                 <a:ea typeface="Calibri" panose="020F0502020204030204" pitchFamily="34" charset="0"/>
               </a:rPr>
               <a:t> V c(x)</a:t>
-            </a:r>
-            <a:r>
-              <a:rPr lang="en-US" sz="1400" dirty="0">
-                <a:effectLst/>
-                <a:latin typeface="Calibri" panose="020F0502020204030204" pitchFamily="34" charset="0"/>
-                <a:ea typeface="Calibri" panose="020F0502020204030204" pitchFamily="34" charset="0"/>
-                <a:cs typeface="Calibri" panose="020F0502020204030204" pitchFamily="34" charset="0"/>
-              </a:rPr>
-              <a:t> Ʌ(</a:t>
-            </a:r>
-            <a:r>
-              <a:rPr lang="en-US" sz="1400" dirty="0">
-                <a:effectLst/>
-                <a:latin typeface="Calibri" panose="020F0502020204030204" pitchFamily="34" charset="0"/>
-                <a:ea typeface="Calibri" panose="020F0502020204030204" pitchFamily="34" charset="0"/>
-                <a:cs typeface="Times New Roman" panose="02020603050405020304" pitchFamily="18" charset="0"/>
-              </a:rPr>
-              <a:t>L1(x) V L2(x))</a:t>
-            </a:r>
-            <a:r>
-              <a:rPr lang="en-US" sz="1400" dirty="0">
-                <a:effectLst/>
-                <a:latin typeface="Calibri" panose="020F0502020204030204" pitchFamily="34" charset="0"/>
-                <a:ea typeface="Calibri" panose="020F0502020204030204" pitchFamily="34" charset="0"/>
-              </a:rPr>
-              <a:t> V d(x)</a:t>
             </a:r>
             <a:r>
               <a:rPr lang="en-US" sz="1400" dirty="0">
@@ -5379,7 +5328,25 @@
                 <a:ea typeface="Calibri" panose="020F0502020204030204" pitchFamily="34" charset="0"/>
                 <a:cs typeface="Times New Roman" panose="02020603050405020304" pitchFamily="18" charset="0"/>
               </a:rPr>
-              <a:t>From database entry 5: Get value of any position in any location</a:t>
+              <a:t>From </a:t>
+            </a:r>
+            <a:r>
+              <a:rPr lang="en-US" sz="1600">
+                <a:effectLst/>
+                <a:latin typeface="Calibri" panose="020F0502020204030204" pitchFamily="34" charset="0"/>
+                <a:ea typeface="Calibri" panose="020F0502020204030204" pitchFamily="34" charset="0"/>
+                <a:cs typeface="Times New Roman" panose="02020603050405020304" pitchFamily="18" charset="0"/>
+              </a:rPr>
+              <a:t>database entries 1 and </a:t>
+            </a:r>
+            <a:r>
+              <a:rPr lang="en-US" sz="1600" dirty="0">
+                <a:effectLst/>
+                <a:latin typeface="Calibri" panose="020F0502020204030204" pitchFamily="34" charset="0"/>
+                <a:ea typeface="Calibri" panose="020F0502020204030204" pitchFamily="34" charset="0"/>
+                <a:cs typeface="Times New Roman" panose="02020603050405020304" pitchFamily="18" charset="0"/>
+              </a:rPr>
+              <a:t>5: Get value of any position in any location</a:t>
             </a:r>
           </a:p>
           <a:p>
@@ -6950,7 +6917,7 @@
           <a:p>
             <a:r>
               <a:rPr lang="en-US" dirty="0"/>
-              <a:t>State #(Final)</a:t>
+              <a:t>State #476</a:t>
             </a:r>
           </a:p>
         </p:txBody>

</xml_diff>